<commit_message>
minor changes to some slides and correction of small mistakes
</commit_message>
<xml_diff>
--- a/Project Bedroom.pptx
+++ b/Project Bedroom.pptx
@@ -238,7 +238,7 @@
           <a:p>
             <a:fld id="{58EBDBEE-1FDA-4F57-947F-5759FA6ABC55}" type="datetimeFigureOut">
               <a:rPr lang="en-US" smtClean="0"/>
-              <a:t>1/16/2020</a:t>
+              <a:t>1/20/2020</a:t>
             </a:fld>
             <a:endParaRPr lang="en-US" dirty="0"/>
           </a:p>
@@ -415,7 +415,7 @@
           <a:p>
             <a:fld id="{CB16A9CD-5E57-4C86-B862-09CA519924BA}" type="datetimeFigureOut">
               <a:rPr lang="en-US" smtClean="0"/>
-              <a:t>1/16/2020</a:t>
+              <a:t>1/20/2020</a:t>
             </a:fld>
             <a:endParaRPr lang="en-US" dirty="0"/>
           </a:p>
@@ -1445,7 +1445,7 @@
           <a:p>
             <a:fld id="{8DA08ED5-AEFE-4443-9040-726EF6690995}" type="datetime1">
               <a:rPr lang="en-US" noProof="0" smtClean="0"/>
-              <a:t>1/16/2020</a:t>
+              <a:t>1/20/2020</a:t>
             </a:fld>
             <a:endParaRPr lang="en-US" noProof="0" dirty="0"/>
           </a:p>
@@ -1917,7 +1917,7 @@
           <a:p>
             <a:fld id="{397CD216-73DE-4B96-8E1B-BB64D86142BB}" type="datetime1">
               <a:rPr lang="en-US" noProof="0" smtClean="0"/>
-              <a:t>1/16/2020</a:t>
+              <a:t>1/20/2020</a:t>
             </a:fld>
             <a:endParaRPr lang="en-US" noProof="0" dirty="0"/>
           </a:p>
@@ -2904,7 +2904,7 @@
           <a:p>
             <a:fld id="{C6A5CD8C-7FEF-4E71-8EB9-D3BA6E2E3E9E}" type="datetime1">
               <a:rPr lang="en-US" noProof="0" smtClean="0"/>
-              <a:t>1/16/2020</a:t>
+              <a:t>1/20/2020</a:t>
             </a:fld>
             <a:endParaRPr lang="en-US" noProof="0" dirty="0"/>
           </a:p>
@@ -3240,7 +3240,7 @@
           <a:p>
             <a:fld id="{8C6D634D-0427-413D-A0D0-098959D06FEF}" type="datetime1">
               <a:rPr lang="en-US" noProof="0" smtClean="0"/>
-              <a:t>1/16/2020</a:t>
+              <a:t>1/20/2020</a:t>
             </a:fld>
             <a:endParaRPr lang="en-US" noProof="0" dirty="0"/>
           </a:p>
@@ -3846,7 +3846,7 @@
           <a:p>
             <a:fld id="{0312561F-7E45-400C-8758-912CDFE9410A}" type="datetime1">
               <a:rPr lang="en-US" noProof="0" smtClean="0"/>
-              <a:t>1/16/2020</a:t>
+              <a:t>1/20/2020</a:t>
             </a:fld>
             <a:endParaRPr lang="en-US" noProof="0" dirty="0"/>
           </a:p>
@@ -4121,7 +4121,7 @@
           <a:p>
             <a:fld id="{85E24BC7-4CDB-41D7-81AF-9CE8473FF4B8}" type="datetime1">
               <a:rPr lang="en-US" noProof="0" smtClean="0"/>
-              <a:t>1/16/2020</a:t>
+              <a:t>1/20/2020</a:t>
             </a:fld>
             <a:endParaRPr lang="en-US" noProof="0" dirty="0"/>
           </a:p>
@@ -4415,7 +4415,7 @@
           <a:p>
             <a:fld id="{397CD216-73DE-4B96-8E1B-BB64D86142BB}" type="datetime1">
               <a:rPr lang="en-US" noProof="0" smtClean="0"/>
-              <a:t>1/16/2020</a:t>
+              <a:t>1/20/2020</a:t>
             </a:fld>
             <a:endParaRPr lang="en-US" noProof="0" dirty="0"/>
           </a:p>
@@ -4798,7 +4798,7 @@
           <a:p>
             <a:fld id="{C6A5CD8C-7FEF-4E71-8EB9-D3BA6E2E3E9E}" type="datetime1">
               <a:rPr lang="en-US" noProof="0" smtClean="0"/>
-              <a:t>1/16/2020</a:t>
+              <a:t>1/20/2020</a:t>
             </a:fld>
             <a:endParaRPr lang="en-US" noProof="0" dirty="0"/>
           </a:p>
@@ -4939,7 +4939,7 @@
           <a:p>
             <a:fld id="{4BE4379E-9B58-41EA-B928-5B1C8436A60E}" type="datetime1">
               <a:rPr lang="en-US" noProof="0" smtClean="0"/>
-              <a:t>1/16/2020</a:t>
+              <a:t>1/20/2020</a:t>
             </a:fld>
             <a:endParaRPr lang="en-US" noProof="0" dirty="0"/>
           </a:p>
@@ -5052,7 +5052,7 @@
           <a:p>
             <a:fld id="{40B0A371-51FE-4D99-BD87-6A650FCE519D}" type="datetime1">
               <a:rPr lang="en-US" noProof="0" smtClean="0"/>
-              <a:t>1/16/2020</a:t>
+              <a:t>1/20/2020</a:t>
             </a:fld>
             <a:endParaRPr lang="en-US" noProof="0" dirty="0"/>
           </a:p>
@@ -5363,7 +5363,7 @@
           <a:p>
             <a:fld id="{5FCF8CFF-A1C0-4B6C-AA8D-BE72CB14468D}" type="datetime1">
               <a:rPr lang="en-US" noProof="0" smtClean="0"/>
-              <a:t>1/16/2020</a:t>
+              <a:t>1/20/2020</a:t>
             </a:fld>
             <a:endParaRPr lang="en-US" noProof="0" dirty="0"/>
           </a:p>
@@ -5655,7 +5655,7 @@
           <a:p>
             <a:fld id="{8C6D634D-0427-413D-A0D0-098959D06FEF}" type="datetime1">
               <a:rPr lang="en-US" noProof="0" smtClean="0"/>
-              <a:t>1/16/2020</a:t>
+              <a:t>1/20/2020</a:t>
             </a:fld>
             <a:endParaRPr lang="en-US" noProof="0" dirty="0"/>
           </a:p>
@@ -5896,7 +5896,7 @@
           <a:p>
             <a:fld id="{3B2591E0-5367-4F2F-9C30-2087D79A846D}" type="datetime1">
               <a:rPr lang="en-US" noProof="0" smtClean="0"/>
-              <a:t>1/16/2020</a:t>
+              <a:t>1/20/2020</a:t>
             </a:fld>
             <a:endParaRPr lang="en-US" noProof="0" dirty="0"/>
           </a:p>
@@ -8058,7 +8058,7 @@
                 </a:solidFill>
                 <a:latin typeface="+mj-lt"/>
               </a:rPr>
-              <a:t>SQL Database</a:t>
+              <a:t>MySQL Database</a:t>
             </a:r>
           </a:p>
         </p:txBody>
@@ -11554,23 +11554,6 @@
 </file>
 
 <file path=customXml/item1.xml><?xml version="1.0" encoding="utf-8"?>
-<?mso-contentType ?>
-<FormTemplates xmlns="http://schemas.microsoft.com/sharepoint/v3/contenttype/forms">
-  <Display>DocumentLibraryForm</Display>
-  <Edit>DocumentLibraryForm</Edit>
-  <New>DocumentLibraryForm</New>
-</FormTemplates>
-</file>
-
-<file path=customXml/item2.xml><?xml version="1.0" encoding="utf-8"?>
-<p:properties xmlns:p="http://schemas.microsoft.com/office/2006/metadata/properties" xmlns:xsi="http://www.w3.org/2001/XMLSchema-instance" xmlns:pc="http://schemas.microsoft.com/office/infopath/2007/PartnerControls">
-  <documentManagement>
-    <MediaServiceKeyPoints xmlns="71af3243-3dd4-4a8d-8c0d-dd76da1f02a5" xsi:nil="true"/>
-  </documentManagement>
-</p:properties>
-</file>
-
-<file path=customXml/item3.xml><?xml version="1.0" encoding="utf-8"?>
 <ct:contentTypeSchema xmlns:ct="http://schemas.microsoft.com/office/2006/metadata/contentType" xmlns:ma="http://schemas.microsoft.com/office/2006/metadata/properties/metaAttributes" ct:_="" ma:_="" ma:contentTypeName="Document" ma:contentTypeID="0x01010079F111ED35F8CC479449609E8A0923A6" ma:contentTypeVersion="11" ma:contentTypeDescription="Create a new document." ma:contentTypeScope="" ma:versionID="9677210f24a1be23c92c90fd886aa0aa">
   <xsd:schema xmlns:xsd="http://www.w3.org/2001/XMLSchema" xmlns:xs="http://www.w3.org/2001/XMLSchema" xmlns:p="http://schemas.microsoft.com/office/2006/metadata/properties" xmlns:ns2="71af3243-3dd4-4a8d-8c0d-dd76da1f02a5" xmlns:ns3="16c05727-aa75-4e4a-9b5f-8a80a1165891" targetNamespace="http://schemas.microsoft.com/office/2006/metadata/properties" ma:root="true" ma:fieldsID="60e05723c5c1908df1a1a4ebf11d344e" ns2:_="" ns3:_="">
     <xsd:import namespace="71af3243-3dd4-4a8d-8c0d-dd76da1f02a5"/>
@@ -11781,25 +11764,24 @@
 </ct:contentTypeSchema>
 </file>
 
-<file path=customXml/itemProps1.xml><?xml version="1.0" encoding="utf-8"?>
-<ds:datastoreItem xmlns:ds="http://schemas.openxmlformats.org/officeDocument/2006/customXml" ds:itemID="{72DAF9E5-DED4-4A50-A81B-4CC218A03F2B}">
-  <ds:schemaRefs>
-    <ds:schemaRef ds:uri="http://schemas.microsoft.com/sharepoint/v3/contenttype/forms"/>
-  </ds:schemaRefs>
-</ds:datastoreItem>
+<file path=customXml/item2.xml><?xml version="1.0" encoding="utf-8"?>
+<p:properties xmlns:p="http://schemas.microsoft.com/office/2006/metadata/properties" xmlns:xsi="http://www.w3.org/2001/XMLSchema-instance" xmlns:pc="http://schemas.microsoft.com/office/infopath/2007/PartnerControls">
+  <documentManagement>
+    <MediaServiceKeyPoints xmlns="71af3243-3dd4-4a8d-8c0d-dd76da1f02a5" xsi:nil="true"/>
+  </documentManagement>
+</p:properties>
 </file>
 
-<file path=customXml/itemProps2.xml><?xml version="1.0" encoding="utf-8"?>
-<ds:datastoreItem xmlns:ds="http://schemas.openxmlformats.org/officeDocument/2006/customXml" ds:itemID="{171946EF-A3EA-4ECB-8D9A-56C36FFF4075}">
-  <ds:schemaRefs>
-    <ds:schemaRef ds:uri="http://schemas.microsoft.com/office/2006/metadata/properties"/>
-    <ds:schemaRef ds:uri="http://schemas.microsoft.com/office/infopath/2007/PartnerControls"/>
-    <ds:schemaRef ds:uri="71af3243-3dd4-4a8d-8c0d-dd76da1f02a5"/>
-  </ds:schemaRefs>
-</ds:datastoreItem>
+<file path=customXml/item3.xml><?xml version="1.0" encoding="utf-8"?>
+<?mso-contentType ?>
+<FormTemplates xmlns="http://schemas.microsoft.com/sharepoint/v3/contenttype/forms">
+  <Display>DocumentLibraryForm</Display>
+  <Edit>DocumentLibraryForm</Edit>
+  <New>DocumentLibraryForm</New>
+</FormTemplates>
 </file>
 
-<file path=customXml/itemProps3.xml><?xml version="1.0" encoding="utf-8"?>
+<file path=customXml/itemProps1.xml><?xml version="1.0" encoding="utf-8"?>
 <ds:datastoreItem xmlns:ds="http://schemas.openxmlformats.org/officeDocument/2006/customXml" ds:itemID="{FFDD087A-3273-4D74-8700-4C8E2BE507D4}">
   <ds:schemaRefs>
     <ds:schemaRef ds:uri="http://schemas.microsoft.com/office/2006/metadata/contentType"/>
@@ -11816,4 +11798,22 @@
     <ds:schemaRef ds:uri="http://schemas.microsoft.com/internal/obd"/>
   </ds:schemaRefs>
 </ds:datastoreItem>
+</file>
+
+<file path=customXml/itemProps2.xml><?xml version="1.0" encoding="utf-8"?>
+<ds:datastoreItem xmlns:ds="http://schemas.openxmlformats.org/officeDocument/2006/customXml" ds:itemID="{171946EF-A3EA-4ECB-8D9A-56C36FFF4075}">
+  <ds:schemaRefs>
+    <ds:schemaRef ds:uri="http://schemas.microsoft.com/office/2006/metadata/properties"/>
+    <ds:schemaRef ds:uri="http://schemas.microsoft.com/office/infopath/2007/PartnerControls"/>
+    <ds:schemaRef ds:uri="71af3243-3dd4-4a8d-8c0d-dd76da1f02a5"/>
+  </ds:schemaRefs>
+</ds:datastoreItem>
+</file>
+
+<file path=customXml/itemProps3.xml><?xml version="1.0" encoding="utf-8"?>
+<ds:datastoreItem xmlns:ds="http://schemas.openxmlformats.org/officeDocument/2006/customXml" ds:itemID="{72DAF9E5-DED4-4A50-A81B-4CC218A03F2B}">
+  <ds:schemaRefs>
+    <ds:schemaRef ds:uri="http://schemas.microsoft.com/sharepoint/v3/contenttype/forms"/>
+  </ds:schemaRefs>
+</ds:datastoreItem>
 </file>
</xml_diff>